<commit_message>
add poll everywhere questions
</commit_message>
<xml_diff>
--- a/Folien/00_Logistik.pptx
+++ b/Folien/00_Logistik.pptx
@@ -5,13 +5,15 @@
     <p:sldMasterId id="2147483648" r:id="rId4"/>
   </p:sldMasterIdLst>
   <p:notesMasterIdLst>
-    <p:notesMasterId r:id="rId9"/>
+    <p:notesMasterId r:id="rId11"/>
   </p:notesMasterIdLst>
   <p:sldIdLst>
     <p:sldId id="291" r:id="rId5"/>
     <p:sldId id="292" r:id="rId6"/>
     <p:sldId id="293" r:id="rId7"/>
-    <p:sldId id="315" r:id="rId8"/>
+    <p:sldId id="316" r:id="rId8"/>
+    <p:sldId id="317" r:id="rId9"/>
+    <p:sldId id="315" r:id="rId10"/>
   </p:sldIdLst>
   <p:sldSz cx="12192000" cy="6858000"/>
   <p:notesSz cx="6858000" cy="9144000"/>
@@ -200,7 +202,7 @@
           <a:p>
             <a:fld id="{1111EAE3-0D17-7D4D-B5C8-7430D3A14508}" type="datetimeFigureOut">
               <a:rPr lang="en-US" smtClean="0"/>
-              <a:t>2/25/22</a:t>
+              <a:t>11/2/22</a:t>
             </a:fld>
             <a:endParaRPr lang="en-US"/>
           </a:p>
@@ -552,6 +554,437 @@
 </p:notes>
 </file>
 
+<file path=ppt/notesSlides/notesSlide2.xml><?xml version="1.0" encoding="utf-8"?>
+<p:notes xmlns:a="http://schemas.openxmlformats.org/drawingml/2006/main" xmlns:r="http://schemas.openxmlformats.org/officeDocument/2006/relationships" xmlns:p="http://schemas.openxmlformats.org/presentationml/2006/main">
+  <p:cSld>
+    <p:spTree>
+      <p:nvGrpSpPr>
+        <p:cNvPr id="1" name=""/>
+        <p:cNvGrpSpPr/>
+        <p:nvPr/>
+      </p:nvGrpSpPr>
+      <p:grpSpPr>
+        <a:xfrm>
+          <a:off x="0" y="0"/>
+          <a:ext cx="0" cy="0"/>
+          <a:chOff x="0" y="0"/>
+          <a:chExt cx="0" cy="0"/>
+        </a:xfrm>
+      </p:grpSpPr>
+      <p:sp>
+        <p:nvSpPr>
+          <p:cNvPr id="2" name="Folienbildplatzhalter 1"/>
+          <p:cNvSpPr>
+            <a:spLocks noGrp="1" noRot="1" noChangeAspect="1"/>
+          </p:cNvSpPr>
+          <p:nvPr>
+            <p:ph type="sldImg"/>
+          </p:nvPr>
+        </p:nvSpPr>
+        <p:spPr/>
+      </p:sp>
+      <p:sp>
+        <p:nvSpPr>
+          <p:cNvPr id="3" name="Notizenplatzhalter 2"/>
+          <p:cNvSpPr>
+            <a:spLocks noGrp="1"/>
+          </p:cNvSpPr>
+          <p:nvPr>
+            <p:ph type="body" idx="1"/>
+          </p:nvPr>
+        </p:nvSpPr>
+        <p:spPr/>
+        <p:txBody>
+          <a:bodyPr/>
+          <a:lstStyle/>
+          <a:p>
+            <a:endParaRPr lang="de-DE"/>
+          </a:p>
+        </p:txBody>
+      </p:sp>
+      <p:sp>
+        <p:nvSpPr>
+          <p:cNvPr id="4" name="Foliennummernplatzhalter 3"/>
+          <p:cNvSpPr>
+            <a:spLocks noGrp="1"/>
+          </p:cNvSpPr>
+          <p:nvPr>
+            <p:ph type="sldNum" sz="quarter" idx="5"/>
+          </p:nvPr>
+        </p:nvSpPr>
+        <p:spPr/>
+        <p:txBody>
+          <a:bodyPr/>
+          <a:lstStyle/>
+          <a:p>
+            <a:fld id="{AD1D79F6-C8AD-5749-9DE6-19634A2965BA}" type="slidenum">
+              <a:rPr lang="en-US" smtClean="0"/>
+              <a:t>2</a:t>
+            </a:fld>
+            <a:endParaRPr lang="en-US"/>
+          </a:p>
+        </p:txBody>
+      </p:sp>
+    </p:spTree>
+    <p:extLst>
+      <p:ext uri="{BB962C8B-B14F-4D97-AF65-F5344CB8AC3E}">
+        <p14:creationId xmlns:p14="http://schemas.microsoft.com/office/powerpoint/2010/main" val="3453828473"/>
+      </p:ext>
+    </p:extLst>
+  </p:cSld>
+  <p:clrMapOvr>
+    <a:masterClrMapping/>
+  </p:clrMapOvr>
+</p:notes>
+</file>
+
+<file path=ppt/notesSlides/notesSlide3.xml><?xml version="1.0" encoding="utf-8"?>
+<p:notes xmlns:a="http://schemas.openxmlformats.org/drawingml/2006/main" xmlns:r="http://schemas.openxmlformats.org/officeDocument/2006/relationships" xmlns:p="http://schemas.openxmlformats.org/presentationml/2006/main">
+  <p:cSld>
+    <p:spTree>
+      <p:nvGrpSpPr>
+        <p:cNvPr id="1" name=""/>
+        <p:cNvGrpSpPr/>
+        <p:nvPr/>
+      </p:nvGrpSpPr>
+      <p:grpSpPr>
+        <a:xfrm>
+          <a:off x="0" y="0"/>
+          <a:ext cx="0" cy="0"/>
+          <a:chOff x="0" y="0"/>
+          <a:chExt cx="0" cy="0"/>
+        </a:xfrm>
+      </p:grpSpPr>
+      <p:sp>
+        <p:nvSpPr>
+          <p:cNvPr id="2" name="Folienbildplatzhalter 1"/>
+          <p:cNvSpPr>
+            <a:spLocks noGrp="1" noRot="1" noChangeAspect="1"/>
+          </p:cNvSpPr>
+          <p:nvPr>
+            <p:ph type="sldImg"/>
+          </p:nvPr>
+        </p:nvSpPr>
+        <p:spPr/>
+      </p:sp>
+      <p:sp>
+        <p:nvSpPr>
+          <p:cNvPr id="3" name="Notizenplatzhalter 2"/>
+          <p:cNvSpPr>
+            <a:spLocks noGrp="1"/>
+          </p:cNvSpPr>
+          <p:nvPr>
+            <p:ph type="body" idx="1"/>
+          </p:nvPr>
+        </p:nvSpPr>
+        <p:spPr/>
+        <p:txBody>
+          <a:bodyPr/>
+          <a:lstStyle/>
+          <a:p>
+            <a:endParaRPr lang="de-DE"/>
+          </a:p>
+        </p:txBody>
+      </p:sp>
+      <p:sp>
+        <p:nvSpPr>
+          <p:cNvPr id="4" name="Foliennummernplatzhalter 3"/>
+          <p:cNvSpPr>
+            <a:spLocks noGrp="1"/>
+          </p:cNvSpPr>
+          <p:nvPr>
+            <p:ph type="sldNum" sz="quarter" idx="5"/>
+          </p:nvPr>
+        </p:nvSpPr>
+        <p:spPr/>
+        <p:txBody>
+          <a:bodyPr/>
+          <a:lstStyle/>
+          <a:p>
+            <a:fld id="{AD1D79F6-C8AD-5749-9DE6-19634A2965BA}" type="slidenum">
+              <a:rPr lang="en-US" smtClean="0"/>
+              <a:t>3</a:t>
+            </a:fld>
+            <a:endParaRPr lang="en-US"/>
+          </a:p>
+        </p:txBody>
+      </p:sp>
+    </p:spTree>
+    <p:extLst>
+      <p:ext uri="{BB962C8B-B14F-4D97-AF65-F5344CB8AC3E}">
+        <p14:creationId xmlns:p14="http://schemas.microsoft.com/office/powerpoint/2010/main" val="1662875066"/>
+      </p:ext>
+    </p:extLst>
+  </p:cSld>
+  <p:clrMapOvr>
+    <a:masterClrMapping/>
+  </p:clrMapOvr>
+</p:notes>
+</file>
+
+<file path=ppt/notesSlides/notesSlide4.xml><?xml version="1.0" encoding="utf-8"?>
+<p:notes xmlns:a="http://schemas.openxmlformats.org/drawingml/2006/main" xmlns:r="http://schemas.openxmlformats.org/officeDocument/2006/relationships" xmlns:p="http://schemas.openxmlformats.org/presentationml/2006/main">
+  <p:cSld>
+    <p:spTree>
+      <p:nvGrpSpPr>
+        <p:cNvPr id="1" name=""/>
+        <p:cNvGrpSpPr/>
+        <p:nvPr/>
+      </p:nvGrpSpPr>
+      <p:grpSpPr>
+        <a:xfrm>
+          <a:off x="0" y="0"/>
+          <a:ext cx="0" cy="0"/>
+          <a:chOff x="0" y="0"/>
+          <a:chExt cx="0" cy="0"/>
+        </a:xfrm>
+      </p:grpSpPr>
+      <p:sp>
+        <p:nvSpPr>
+          <p:cNvPr id="2" name="Folienbildplatzhalter 1"/>
+          <p:cNvSpPr>
+            <a:spLocks noGrp="1" noRot="1" noChangeAspect="1"/>
+          </p:cNvSpPr>
+          <p:nvPr>
+            <p:ph type="sldImg"/>
+          </p:nvPr>
+        </p:nvSpPr>
+        <p:spPr/>
+      </p:sp>
+      <p:sp>
+        <p:nvSpPr>
+          <p:cNvPr id="3" name="Notizenplatzhalter 2"/>
+          <p:cNvSpPr>
+            <a:spLocks noGrp="1"/>
+          </p:cNvSpPr>
+          <p:nvPr>
+            <p:ph type="body" idx="1"/>
+          </p:nvPr>
+        </p:nvSpPr>
+        <p:spPr/>
+        <p:txBody>
+          <a:bodyPr/>
+          <a:lstStyle/>
+          <a:p>
+            <a:endParaRPr lang="de-DE"/>
+          </a:p>
+        </p:txBody>
+      </p:sp>
+      <p:sp>
+        <p:nvSpPr>
+          <p:cNvPr id="4" name="Foliennummernplatzhalter 3"/>
+          <p:cNvSpPr>
+            <a:spLocks noGrp="1"/>
+          </p:cNvSpPr>
+          <p:nvPr>
+            <p:ph type="sldNum" sz="quarter" idx="5"/>
+          </p:nvPr>
+        </p:nvSpPr>
+        <p:spPr/>
+        <p:txBody>
+          <a:bodyPr/>
+          <a:lstStyle/>
+          <a:p>
+            <a:fld id="{AD1D79F6-C8AD-5749-9DE6-19634A2965BA}" type="slidenum">
+              <a:rPr lang="en-US" smtClean="0"/>
+              <a:t>4</a:t>
+            </a:fld>
+            <a:endParaRPr lang="en-US"/>
+          </a:p>
+        </p:txBody>
+      </p:sp>
+    </p:spTree>
+    <p:extLst>
+      <p:ext uri="{BB962C8B-B14F-4D97-AF65-F5344CB8AC3E}">
+        <p14:creationId xmlns:p14="http://schemas.microsoft.com/office/powerpoint/2010/main" val="472827135"/>
+      </p:ext>
+    </p:extLst>
+  </p:cSld>
+  <p:clrMapOvr>
+    <a:masterClrMapping/>
+  </p:clrMapOvr>
+</p:notes>
+</file>
+
+<file path=ppt/notesSlides/notesSlide5.xml><?xml version="1.0" encoding="utf-8"?>
+<p:notes xmlns:a="http://schemas.openxmlformats.org/drawingml/2006/main" xmlns:r="http://schemas.openxmlformats.org/officeDocument/2006/relationships" xmlns:p="http://schemas.openxmlformats.org/presentationml/2006/main">
+  <p:cSld>
+    <p:spTree>
+      <p:nvGrpSpPr>
+        <p:cNvPr id="1" name=""/>
+        <p:cNvGrpSpPr/>
+        <p:nvPr/>
+      </p:nvGrpSpPr>
+      <p:grpSpPr>
+        <a:xfrm>
+          <a:off x="0" y="0"/>
+          <a:ext cx="0" cy="0"/>
+          <a:chOff x="0" y="0"/>
+          <a:chExt cx="0" cy="0"/>
+        </a:xfrm>
+      </p:grpSpPr>
+      <p:sp>
+        <p:nvSpPr>
+          <p:cNvPr id="2" name="Folienbildplatzhalter 1"/>
+          <p:cNvSpPr>
+            <a:spLocks noGrp="1" noRot="1" noChangeAspect="1"/>
+          </p:cNvSpPr>
+          <p:nvPr>
+            <p:ph type="sldImg"/>
+          </p:nvPr>
+        </p:nvSpPr>
+        <p:spPr/>
+      </p:sp>
+      <p:sp>
+        <p:nvSpPr>
+          <p:cNvPr id="3" name="Notizenplatzhalter 2"/>
+          <p:cNvSpPr>
+            <a:spLocks noGrp="1"/>
+          </p:cNvSpPr>
+          <p:nvPr>
+            <p:ph type="body" idx="1"/>
+          </p:nvPr>
+        </p:nvSpPr>
+        <p:spPr/>
+        <p:txBody>
+          <a:bodyPr/>
+          <a:lstStyle/>
+          <a:p>
+            <a:r>
+              <a:rPr lang="de-DE"/>
+              <a:t>Do not modify the notes in this section to avoid tampering with the Poll Everywhere activity.
+More info at polleverywhere.com/support
+Was ist euer Kursziel</a:t>
+            </a:r>
+          </a:p>
+          <a:p>
+            <a:r>
+              <a:rPr lang="de-DE"/>
+              <a:t>https://www.polleverywhere.com/free_text_polls/xQMsxYNorlTJ3mw3aLbL1</a:t>
+            </a:r>
+          </a:p>
+        </p:txBody>
+      </p:sp>
+      <p:sp>
+        <p:nvSpPr>
+          <p:cNvPr id="4" name="Foliennummernplatzhalter 3"/>
+          <p:cNvSpPr>
+            <a:spLocks noGrp="1"/>
+          </p:cNvSpPr>
+          <p:nvPr>
+            <p:ph type="sldNum" sz="quarter" idx="5"/>
+          </p:nvPr>
+        </p:nvSpPr>
+        <p:spPr/>
+        <p:txBody>
+          <a:bodyPr/>
+          <a:lstStyle/>
+          <a:p>
+            <a:fld id="{AD1D79F6-C8AD-5749-9DE6-19634A2965BA}" type="slidenum">
+              <a:rPr lang="en-US" smtClean="0"/>
+              <a:t>5</a:t>
+            </a:fld>
+            <a:endParaRPr lang="en-US"/>
+          </a:p>
+        </p:txBody>
+      </p:sp>
+    </p:spTree>
+    <p:extLst>
+      <p:ext uri="{BB962C8B-B14F-4D97-AF65-F5344CB8AC3E}">
+        <p14:creationId xmlns:p14="http://schemas.microsoft.com/office/powerpoint/2010/main" val="2380360730"/>
+      </p:ext>
+    </p:extLst>
+  </p:cSld>
+  <p:clrMapOvr>
+    <a:masterClrMapping/>
+  </p:clrMapOvr>
+</p:notes>
+</file>
+
+<file path=ppt/notesSlides/notesSlide6.xml><?xml version="1.0" encoding="utf-8"?>
+<p:notes xmlns:a="http://schemas.openxmlformats.org/drawingml/2006/main" xmlns:r="http://schemas.openxmlformats.org/officeDocument/2006/relationships" xmlns:p="http://schemas.openxmlformats.org/presentationml/2006/main">
+  <p:cSld>
+    <p:spTree>
+      <p:nvGrpSpPr>
+        <p:cNvPr id="1" name=""/>
+        <p:cNvGrpSpPr/>
+        <p:nvPr/>
+      </p:nvGrpSpPr>
+      <p:grpSpPr>
+        <a:xfrm>
+          <a:off x="0" y="0"/>
+          <a:ext cx="0" cy="0"/>
+          <a:chOff x="0" y="0"/>
+          <a:chExt cx="0" cy="0"/>
+        </a:xfrm>
+      </p:grpSpPr>
+      <p:sp>
+        <p:nvSpPr>
+          <p:cNvPr id="2" name="Folienbildplatzhalter 1"/>
+          <p:cNvSpPr>
+            <a:spLocks noGrp="1" noRot="1" noChangeAspect="1"/>
+          </p:cNvSpPr>
+          <p:nvPr>
+            <p:ph type="sldImg"/>
+          </p:nvPr>
+        </p:nvSpPr>
+        <p:spPr/>
+      </p:sp>
+      <p:sp>
+        <p:nvSpPr>
+          <p:cNvPr id="3" name="Notizenplatzhalter 2"/>
+          <p:cNvSpPr>
+            <a:spLocks noGrp="1"/>
+          </p:cNvSpPr>
+          <p:nvPr>
+            <p:ph type="body" idx="1"/>
+          </p:nvPr>
+        </p:nvSpPr>
+        <p:spPr/>
+        <p:txBody>
+          <a:bodyPr/>
+          <a:lstStyle/>
+          <a:p>
+            <a:endParaRPr lang="de-DE"/>
+          </a:p>
+        </p:txBody>
+      </p:sp>
+      <p:sp>
+        <p:nvSpPr>
+          <p:cNvPr id="4" name="Foliennummernplatzhalter 3"/>
+          <p:cNvSpPr>
+            <a:spLocks noGrp="1"/>
+          </p:cNvSpPr>
+          <p:nvPr>
+            <p:ph type="sldNum" sz="quarter" idx="5"/>
+          </p:nvPr>
+        </p:nvSpPr>
+        <p:spPr/>
+        <p:txBody>
+          <a:bodyPr/>
+          <a:lstStyle/>
+          <a:p>
+            <a:fld id="{AD1D79F6-C8AD-5749-9DE6-19634A2965BA}" type="slidenum">
+              <a:rPr lang="en-US" smtClean="0"/>
+              <a:t>6</a:t>
+            </a:fld>
+            <a:endParaRPr lang="en-US"/>
+          </a:p>
+        </p:txBody>
+      </p:sp>
+    </p:spTree>
+    <p:extLst>
+      <p:ext uri="{BB962C8B-B14F-4D97-AF65-F5344CB8AC3E}">
+        <p14:creationId xmlns:p14="http://schemas.microsoft.com/office/powerpoint/2010/main" val="3281226421"/>
+      </p:ext>
+    </p:extLst>
+  </p:cSld>
+  <p:clrMapOvr>
+    <a:masterClrMapping/>
+  </p:clrMapOvr>
+</p:notes>
+</file>
+
 <file path=ppt/slideLayouts/slideLayout1.xml><?xml version="1.0" encoding="utf-8"?>
 <p:sldLayout xmlns:a="http://schemas.openxmlformats.org/drawingml/2006/main" xmlns:r="http://schemas.openxmlformats.org/officeDocument/2006/relationships" xmlns:p="http://schemas.openxmlformats.org/presentationml/2006/main" type="title" preserve="1">
   <p:cSld name="Title Slide">
@@ -699,7 +1132,7 @@
           <a:p>
             <a:fld id="{46878720-212C-42BB-B356-99628BFE1EBF}" type="datetimeFigureOut">
               <a:rPr lang="en-US" smtClean="0"/>
-              <a:t>2/25/22</a:t>
+              <a:t>11/2/22</a:t>
             </a:fld>
             <a:endParaRPr lang="en-US"/>
           </a:p>
@@ -897,7 +1330,7 @@
           <a:p>
             <a:fld id="{46878720-212C-42BB-B356-99628BFE1EBF}" type="datetimeFigureOut">
               <a:rPr lang="en-US" smtClean="0"/>
-              <a:t>2/25/22</a:t>
+              <a:t>11/2/22</a:t>
             </a:fld>
             <a:endParaRPr lang="en-US"/>
           </a:p>
@@ -1105,7 +1538,7 @@
           <a:p>
             <a:fld id="{46878720-212C-42BB-B356-99628BFE1EBF}" type="datetimeFigureOut">
               <a:rPr lang="en-US" smtClean="0"/>
-              <a:t>2/25/22</a:t>
+              <a:t>11/2/22</a:t>
             </a:fld>
             <a:endParaRPr lang="en-US"/>
           </a:p>
@@ -1303,7 +1736,7 @@
           <a:p>
             <a:fld id="{46878720-212C-42BB-B356-99628BFE1EBF}" type="datetimeFigureOut">
               <a:rPr lang="en-US" smtClean="0"/>
-              <a:t>2/25/22</a:t>
+              <a:t>11/2/22</a:t>
             </a:fld>
             <a:endParaRPr lang="en-US"/>
           </a:p>
@@ -1578,7 +2011,7 @@
           <a:p>
             <a:fld id="{46878720-212C-42BB-B356-99628BFE1EBF}" type="datetimeFigureOut">
               <a:rPr lang="en-US" smtClean="0"/>
-              <a:t>2/25/22</a:t>
+              <a:t>11/2/22</a:t>
             </a:fld>
             <a:endParaRPr lang="en-US"/>
           </a:p>
@@ -1843,7 +2276,7 @@
           <a:p>
             <a:fld id="{46878720-212C-42BB-B356-99628BFE1EBF}" type="datetimeFigureOut">
               <a:rPr lang="en-US" smtClean="0"/>
-              <a:t>2/25/22</a:t>
+              <a:t>11/2/22</a:t>
             </a:fld>
             <a:endParaRPr lang="en-US"/>
           </a:p>
@@ -2255,7 +2688,7 @@
           <a:p>
             <a:fld id="{46878720-212C-42BB-B356-99628BFE1EBF}" type="datetimeFigureOut">
               <a:rPr lang="en-US" smtClean="0"/>
-              <a:t>2/25/22</a:t>
+              <a:t>11/2/22</a:t>
             </a:fld>
             <a:endParaRPr lang="en-US"/>
           </a:p>
@@ -2396,7 +2829,7 @@
           <a:p>
             <a:fld id="{46878720-212C-42BB-B356-99628BFE1EBF}" type="datetimeFigureOut">
               <a:rPr lang="en-US" smtClean="0"/>
-              <a:t>2/25/22</a:t>
+              <a:t>11/2/22</a:t>
             </a:fld>
             <a:endParaRPr lang="en-US"/>
           </a:p>
@@ -2509,7 +2942,7 @@
           <a:p>
             <a:fld id="{46878720-212C-42BB-B356-99628BFE1EBF}" type="datetimeFigureOut">
               <a:rPr lang="en-US" smtClean="0"/>
-              <a:t>2/25/22</a:t>
+              <a:t>11/2/22</a:t>
             </a:fld>
             <a:endParaRPr lang="en-US"/>
           </a:p>
@@ -2820,7 +3253,7 @@
           <a:p>
             <a:fld id="{46878720-212C-42BB-B356-99628BFE1EBF}" type="datetimeFigureOut">
               <a:rPr lang="en-US" smtClean="0"/>
-              <a:t>2/25/22</a:t>
+              <a:t>11/2/22</a:t>
             </a:fld>
             <a:endParaRPr lang="en-US"/>
           </a:p>
@@ -3108,7 +3541,7 @@
           <a:p>
             <a:fld id="{46878720-212C-42BB-B356-99628BFE1EBF}" type="datetimeFigureOut">
               <a:rPr lang="en-US" smtClean="0"/>
-              <a:t>2/25/22</a:t>
+              <a:t>11/2/22</a:t>
             </a:fld>
             <a:endParaRPr lang="en-US"/>
           </a:p>
@@ -3349,7 +3782,7 @@
           <a:p>
             <a:fld id="{46878720-212C-42BB-B356-99628BFE1EBF}" type="datetimeFigureOut">
               <a:rPr lang="en-US" smtClean="0"/>
-              <a:t>2/25/22</a:t>
+              <a:t>11/2/22</a:t>
             </a:fld>
             <a:endParaRPr lang="en-US"/>
           </a:p>
@@ -4387,7 +4820,7 @@
         <p:spPr/>
         <p:txBody>
           <a:bodyPr>
-            <a:normAutofit fontScale="92500" lnSpcReduction="10000"/>
+            <a:normAutofit/>
           </a:bodyPr>
           <a:lstStyle/>
           <a:p>
@@ -4413,12 +4846,6 @@
           <a:p>
             <a:r>
               <a:rPr lang="de-DE" dirty="0"/>
-              <a:t>Corona-Regeln für diesen Kurs</a:t>
-            </a:r>
-          </a:p>
-          <a:p>
-            <a:r>
-              <a:rPr lang="de-DE" dirty="0"/>
               <a:t>Kursziele – was machen wir in diesem Kurs</a:t>
             </a:r>
           </a:p>
@@ -4457,7 +4884,7 @@
             <a:pPr lvl="1"/>
             <a:r>
               <a:rPr lang="de-DE" u="sng" dirty="0">
-                <a:hlinkClick r:id="rId2"/>
+                <a:hlinkClick r:id="rId3"/>
               </a:rPr>
               <a:t>https://github.com/itfolks-org/Arduino-Schnupperkurs-Deutsch</a:t>
             </a:r>
@@ -4575,7 +5002,7 @@
           <a:p>
             <a:r>
               <a:rPr lang="de-DE" dirty="0">
-                <a:hlinkClick r:id="rId2"/>
+                <a:hlinkClick r:id="rId3"/>
               </a:rPr>
               <a:t>https://youtu.be/1msnPf8uimU</a:t>
             </a:r>
@@ -4590,33 +5017,15 @@
               <a:t>Kartenausgabegerät</a:t>
             </a:r>
             <a:endParaRPr lang="de-DE" dirty="0">
-              <a:hlinkClick r:id="rId3"/>
+              <a:hlinkClick r:id="rId4"/>
             </a:endParaRPr>
-          </a:p>
-          <a:p>
-            <a:r>
-              <a:rPr lang="de-DE" dirty="0">
-                <a:hlinkClick r:id="rId3"/>
-              </a:rPr>
-              <a:t>https://blog.arduino.cc/2022/02/01/create-this-card-dealing-robot-to-streamline-your-poker-nights/</a:t>
-            </a:r>
-            <a:endParaRPr lang="de-DE" dirty="0"/>
-          </a:p>
-          <a:p>
-            <a:endParaRPr lang="de-DE" dirty="0"/>
-          </a:p>
-          <a:p>
-            <a:r>
-              <a:rPr lang="de-DE" dirty="0"/>
-              <a:t>Ostereier-Mal-maschine</a:t>
-            </a:r>
           </a:p>
           <a:p>
             <a:r>
               <a:rPr lang="de-DE" dirty="0">
                 <a:hlinkClick r:id="rId4"/>
               </a:rPr>
-              <a:t>https://youtu.be/cFJ1CX3XbK0</a:t>
+              <a:t>https://blog.arduino.cc/2022/02/01/create-this-card-dealing-robot-to-streamline-your-poker-nights/</a:t>
             </a:r>
             <a:endParaRPr lang="de-DE" dirty="0"/>
           </a:p>
@@ -4625,12 +5034,8 @@
           </a:p>
           <a:p>
             <a:r>
-              <a:rPr lang="de-DE" dirty="0" err="1"/>
-              <a:t>T-shirt</a:t>
-            </a:r>
-            <a:r>
               <a:rPr lang="de-DE" dirty="0"/>
-              <a:t>-Falt-maschine</a:t>
+              <a:t>Ostereier-Mal-maschine</a:t>
             </a:r>
           </a:p>
           <a:p>
@@ -4638,7 +5043,7 @@
               <a:rPr lang="de-DE" dirty="0">
                 <a:hlinkClick r:id="rId5"/>
               </a:rPr>
-              <a:t>https://www.youtube.com/watch?v=ZH7a5cCcsQ0</a:t>
+              <a:t>https://youtu.be/cFJ1CX3XbK0</a:t>
             </a:r>
             <a:endParaRPr lang="de-DE" dirty="0"/>
           </a:p>
@@ -4648,16 +5053,19 @@
           <a:p>
             <a:r>
               <a:rPr lang="de-DE" dirty="0" err="1"/>
-              <a:t>Kellerentfeuchtmaschine</a:t>
-            </a:r>
-            <a:endParaRPr lang="de-DE" dirty="0"/>
+              <a:t>T-shirt</a:t>
+            </a:r>
+            <a:r>
+              <a:rPr lang="de-DE" dirty="0"/>
+              <a:t>-Falt-maschine</a:t>
+            </a:r>
           </a:p>
           <a:p>
             <a:r>
               <a:rPr lang="de-DE" dirty="0">
                 <a:hlinkClick r:id="rId6"/>
               </a:rPr>
-              <a:t>https://www.heise.de/news/Arduino-Projekt-Kellerluefter-mit-Taupunktsteuerung-6475218.html?wt_mc=rss.red.ho.ho.atom.beitrag.beitrag</a:t>
+              <a:t>https://www.youtube.com/watch?v=ZH7a5cCcsQ0</a:t>
             </a:r>
             <a:endParaRPr lang="de-DE" dirty="0"/>
           </a:p>
@@ -4666,23 +5074,42 @@
           </a:p>
           <a:p>
             <a:r>
-              <a:rPr lang="de-DE" dirty="0"/>
-              <a:t>Offizieller </a:t>
-            </a:r>
-            <a:r>
               <a:rPr lang="de-DE" dirty="0" err="1"/>
-              <a:t>Arduino</a:t>
-            </a:r>
-            <a:r>
-              <a:rPr lang="de-DE" dirty="0"/>
-              <a:t> Project Hub</a:t>
-            </a:r>
+              <a:t>Kellerentfeuchtmaschine</a:t>
+            </a:r>
+            <a:endParaRPr lang="de-DE" dirty="0"/>
           </a:p>
           <a:p>
             <a:r>
               <a:rPr lang="de-DE" dirty="0">
                 <a:hlinkClick r:id="rId7"/>
               </a:rPr>
+              <a:t>https://www.heise.de/news/Arduino-Projekt-Kellerluefter-mit-Taupunktsteuerung-6475218.html?wt_mc=rss.red.ho.ho.atom.beitrag.beitrag</a:t>
+            </a:r>
+            <a:endParaRPr lang="de-DE" dirty="0"/>
+          </a:p>
+          <a:p>
+            <a:endParaRPr lang="de-DE" dirty="0"/>
+          </a:p>
+          <a:p>
+            <a:r>
+              <a:rPr lang="de-DE" dirty="0"/>
+              <a:t>Offizieller </a:t>
+            </a:r>
+            <a:r>
+              <a:rPr lang="de-DE" dirty="0" err="1"/>
+              <a:t>Arduino</a:t>
+            </a:r>
+            <a:r>
+              <a:rPr lang="de-DE" dirty="0"/>
+              <a:t> Project Hub</a:t>
+            </a:r>
+          </a:p>
+          <a:p>
+            <a:r>
+              <a:rPr lang="de-DE" dirty="0">
+                <a:hlinkClick r:id="rId8"/>
+              </a:rPr>
               <a:t>https://create.arduino.cc/projecthub</a:t>
             </a:r>
             <a:endParaRPr lang="de-DE" dirty="0"/>
@@ -4696,7 +5123,7 @@
           <a:p>
             <a:r>
               <a:rPr lang="de-DE" dirty="0">
-                <a:hlinkClick r:id="rId8"/>
+                <a:hlinkClick r:id="rId9"/>
               </a:rPr>
               <a:t>https://create.arduino.cc/projecthub/masteruan/home-temperature-while-you-re-on-holiday-3ab805?ref=platform&amp;ref_id=424_trending_part%27A=0__&amp;offset=2</a:t>
             </a:r>
@@ -4727,6 +5154,268 @@
 </file>
 
 <file path=ppt/slides/slide4.xml><?xml version="1.0" encoding="utf-8"?>
+<p:sld xmlns:a="http://schemas.openxmlformats.org/drawingml/2006/main" xmlns:r="http://schemas.openxmlformats.org/officeDocument/2006/relationships" xmlns:p="http://schemas.openxmlformats.org/presentationml/2006/main">
+  <p:cSld>
+    <p:spTree>
+      <p:nvGrpSpPr>
+        <p:cNvPr id="1" name=""/>
+        <p:cNvGrpSpPr/>
+        <p:nvPr/>
+      </p:nvGrpSpPr>
+      <p:grpSpPr>
+        <a:xfrm>
+          <a:off x="0" y="0"/>
+          <a:ext cx="0" cy="0"/>
+          <a:chOff x="0" y="0"/>
+          <a:chExt cx="0" cy="0"/>
+        </a:xfrm>
+      </p:grpSpPr>
+      <p:sp>
+        <p:nvSpPr>
+          <p:cNvPr id="2" name="Titel 1">
+            <a:extLst>
+              <a:ext uri="{FF2B5EF4-FFF2-40B4-BE49-F238E27FC236}">
+                <a16:creationId xmlns:a16="http://schemas.microsoft.com/office/drawing/2014/main" id="{8C8FDB73-9474-486A-559B-F2E4FB00FE9D}"/>
+              </a:ext>
+            </a:extLst>
+          </p:cNvPr>
+          <p:cNvSpPr>
+            <a:spLocks noGrp="1"/>
+          </p:cNvSpPr>
+          <p:nvPr>
+            <p:ph type="title"/>
+          </p:nvPr>
+        </p:nvSpPr>
+        <p:spPr/>
+        <p:txBody>
+          <a:bodyPr/>
+          <a:lstStyle/>
+          <a:p>
+            <a:r>
+              <a:rPr lang="de-DE" dirty="0"/>
+              <a:t>Interaktive Fragen während des Kurses</a:t>
+            </a:r>
+            <a:br>
+              <a:rPr lang="de-DE" dirty="0"/>
+            </a:br>
+            <a:r>
+              <a:rPr lang="de-DE" dirty="0"/>
+              <a:t>auf Handy oder PC beantworten:</a:t>
+            </a:r>
+          </a:p>
+        </p:txBody>
+      </p:sp>
+      <p:sp>
+        <p:nvSpPr>
+          <p:cNvPr id="3" name="Inhaltsplatzhalter 2">
+            <a:extLst>
+              <a:ext uri="{FF2B5EF4-FFF2-40B4-BE49-F238E27FC236}">
+                <a16:creationId xmlns:a16="http://schemas.microsoft.com/office/drawing/2014/main" id="{3764EB85-7D7D-6B12-1CC8-1EB244255619}"/>
+              </a:ext>
+            </a:extLst>
+          </p:cNvPr>
+          <p:cNvSpPr>
+            <a:spLocks noGrp="1"/>
+          </p:cNvSpPr>
+          <p:nvPr>
+            <p:ph idx="1"/>
+          </p:nvPr>
+        </p:nvSpPr>
+        <p:spPr/>
+        <p:txBody>
+          <a:bodyPr/>
+          <a:lstStyle/>
+          <a:p>
+            <a:r>
+              <a:rPr lang="de-DE" dirty="0"/>
+              <a:t>Um mitzumachen:    	</a:t>
+            </a:r>
+            <a:r>
+              <a:rPr lang="de-DE" dirty="0" err="1"/>
+              <a:t>pollev.com</a:t>
+            </a:r>
+            <a:endParaRPr lang="de-DE" dirty="0"/>
+          </a:p>
+          <a:p>
+            <a:r>
+              <a:rPr lang="de-DE" dirty="0"/>
+              <a:t>Eingeben: 			PETERB635</a:t>
+            </a:r>
+          </a:p>
+          <a:p>
+            <a:r>
+              <a:rPr lang="de-DE" dirty="0"/>
+              <a:t>Optional einen Namen angeben (Spitzname oder Klarname)</a:t>
+            </a:r>
+          </a:p>
+          <a:p>
+            <a:r>
+              <a:rPr lang="de-DE" dirty="0"/>
+              <a:t>Oder diesen QR-Code verwenden</a:t>
+            </a:r>
+          </a:p>
+        </p:txBody>
+      </p:sp>
+      <p:pic>
+        <p:nvPicPr>
+          <p:cNvPr id="4" name="Grafik 3">
+            <a:extLst>
+              <a:ext uri="{FF2B5EF4-FFF2-40B4-BE49-F238E27FC236}">
+                <a16:creationId xmlns:a16="http://schemas.microsoft.com/office/drawing/2014/main" id="{C209BB2B-24CC-A055-0FFB-A6F01E6F99B3}"/>
+              </a:ext>
+            </a:extLst>
+          </p:cNvPr>
+          <p:cNvPicPr>
+            <a:picLocks noChangeAspect="1"/>
+          </p:cNvPicPr>
+          <p:nvPr/>
+        </p:nvPicPr>
+        <p:blipFill>
+          <a:blip r:embed="rId3"/>
+          <a:stretch>
+            <a:fillRect/>
+          </a:stretch>
+        </p:blipFill>
+        <p:spPr>
+          <a:xfrm>
+            <a:off x="7180826" y="3302000"/>
+            <a:ext cx="3606800" cy="3556000"/>
+          </a:xfrm>
+          <a:prstGeom prst="rect">
+            <a:avLst/>
+          </a:prstGeom>
+        </p:spPr>
+      </p:pic>
+    </p:spTree>
+    <p:extLst>
+      <p:ext uri="{BB962C8B-B14F-4D97-AF65-F5344CB8AC3E}">
+        <p14:creationId xmlns:p14="http://schemas.microsoft.com/office/powerpoint/2010/main" val="2404916275"/>
+      </p:ext>
+    </p:extLst>
+  </p:cSld>
+  <p:clrMapOvr>
+    <a:masterClrMapping/>
+  </p:clrMapOvr>
+</p:sld>
+</file>
+
+<file path=ppt/slides/slide5.xml><?xml version="1.0" encoding="utf-8"?>
+<p:sld xmlns:a="http://schemas.openxmlformats.org/drawingml/2006/main" xmlns:r="http://schemas.openxmlformats.org/officeDocument/2006/relationships" xmlns:p="http://schemas.openxmlformats.org/presentationml/2006/main">
+  <p:cSld>
+    <p:spTree>
+      <p:nvGrpSpPr>
+        <p:cNvPr id="1" name=""/>
+        <p:cNvGrpSpPr/>
+        <p:nvPr/>
+      </p:nvGrpSpPr>
+      <p:grpSpPr>
+        <a:xfrm>
+          <a:off x="0" y="0"/>
+          <a:ext cx="0" cy="0"/>
+          <a:chOff x="0" y="0"/>
+          <a:chExt cx="0" cy="0"/>
+        </a:xfrm>
+      </p:grpSpPr>
+      <p:sp>
+        <p:nvSpPr>
+          <p:cNvPr id="2" name="Titel 1">
+            <a:extLst>
+              <a:ext uri="{FF2B5EF4-FFF2-40B4-BE49-F238E27FC236}">
+                <a16:creationId xmlns:a16="http://schemas.microsoft.com/office/drawing/2014/main" id="{004DFE45-8BB5-1D55-7E9F-66A8E2939CEE}"/>
+              </a:ext>
+            </a:extLst>
+          </p:cNvPr>
+          <p:cNvSpPr>
+            <a:spLocks noGrp="1"/>
+          </p:cNvSpPr>
+          <p:nvPr>
+            <p:ph type="ctrTitle"/>
+          </p:nvPr>
+        </p:nvSpPr>
+        <p:spPr/>
+        <p:txBody>
+          <a:bodyPr/>
+          <a:lstStyle/>
+          <a:p>
+            <a:endParaRPr lang="de-DE"/>
+          </a:p>
+        </p:txBody>
+      </p:sp>
+      <p:sp>
+        <p:nvSpPr>
+          <p:cNvPr id="3" name="Untertitel 2">
+            <a:extLst>
+              <a:ext uri="{FF2B5EF4-FFF2-40B4-BE49-F238E27FC236}">
+                <a16:creationId xmlns:a16="http://schemas.microsoft.com/office/drawing/2014/main" id="{C453D79F-667C-31D7-77F1-400D932DF89D}"/>
+              </a:ext>
+            </a:extLst>
+          </p:cNvPr>
+          <p:cNvSpPr>
+            <a:spLocks noGrp="1"/>
+          </p:cNvSpPr>
+          <p:nvPr>
+            <p:ph type="subTitle" idx="1"/>
+          </p:nvPr>
+        </p:nvSpPr>
+        <p:spPr/>
+        <p:txBody>
+          <a:bodyPr/>
+          <a:lstStyle/>
+          <a:p>
+            <a:endParaRPr lang="de-DE"/>
+          </a:p>
+        </p:txBody>
+      </p:sp>
+      <p:pic>
+        <p:nvPicPr>
+          <p:cNvPr id="5" name="slide.url=https://www.polleverywhere.com/free_text_polls/xQMsxYNorlTJ3mw3aLbL1">
+            <a:extLst>
+              <a:ext uri="{FF2B5EF4-FFF2-40B4-BE49-F238E27FC236}">
+                <a16:creationId xmlns:a16="http://schemas.microsoft.com/office/drawing/2014/main" id="{CB02E0B1-2193-525A-11E9-9DD30C8AD9A0}"/>
+              </a:ext>
+            </a:extLst>
+          </p:cNvPr>
+          <p:cNvPicPr>
+            <a:picLocks/>
+          </p:cNvPicPr>
+          <p:nvPr/>
+        </p:nvPicPr>
+        <p:blipFill>
+          <a:blip r:embed="rId3">
+            <a:extLst>
+              <a:ext uri="{28A0092B-C50C-407E-A947-70E740481C1C}">
+                <a14:useLocalDpi xmlns:a14="http://schemas.microsoft.com/office/drawing/2010/main" val="0"/>
+              </a:ext>
+            </a:extLst>
+          </a:blip>
+          <a:stretch>
+            <a:fillRect/>
+          </a:stretch>
+        </p:blipFill>
+        <p:spPr>
+          <a:xfrm>
+            <a:off x="63500" y="63500"/>
+            <a:ext cx="12065000" cy="6731000"/>
+          </a:xfrm>
+          <a:prstGeom prst="rect">
+            <a:avLst/>
+          </a:prstGeom>
+        </p:spPr>
+      </p:pic>
+    </p:spTree>
+    <p:extLst>
+      <p:ext uri="{BB962C8B-B14F-4D97-AF65-F5344CB8AC3E}">
+        <p14:creationId xmlns:p14="http://schemas.microsoft.com/office/powerpoint/2010/main" val="3846126047"/>
+      </p:ext>
+    </p:extLst>
+  </p:cSld>
+  <p:clrMapOvr>
+    <a:masterClrMapping/>
+  </p:clrMapOvr>
+</p:sld>
+</file>
+
+<file path=ppt/slides/slide6.xml><?xml version="1.0" encoding="utf-8"?>
 <p:sld xmlns:a="http://schemas.openxmlformats.org/drawingml/2006/main" xmlns:r="http://schemas.openxmlformats.org/officeDocument/2006/relationships" xmlns:p="http://schemas.openxmlformats.org/presentationml/2006/main">
   <p:cSld>
     <p:spTree>
@@ -5466,9 +6155,12 @@
 </file>
 
 <file path=customXml/item1.xml><?xml version="1.0" encoding="utf-8"?>
-<p:properties xmlns:p="http://schemas.microsoft.com/office/2006/metadata/properties" xmlns:xsi="http://www.w3.org/2001/XMLSchema-instance" xmlns:pc="http://schemas.microsoft.com/office/infopath/2007/PartnerControls">
-  <documentManagement/>
-</p:properties>
+<?mso-contentType ?>
+<FormTemplates xmlns="http://schemas.microsoft.com/sharepoint/v3/contenttype/forms">
+  <Display>DocumentLibraryForm</Display>
+  <Edit>DocumentLibraryForm</Edit>
+  <New>DocumentLibraryForm</New>
+</FormTemplates>
 </file>
 
 <file path=customXml/item2.xml><?xml version="1.0" encoding="utf-8"?>
@@ -5689,27 +6381,15 @@
 </file>
 
 <file path=customXml/item3.xml><?xml version="1.0" encoding="utf-8"?>
-<?mso-contentType ?>
-<FormTemplates xmlns="http://schemas.microsoft.com/sharepoint/v3/contenttype/forms">
-  <Display>DocumentLibraryForm</Display>
-  <Edit>DocumentLibraryForm</Edit>
-  <New>DocumentLibraryForm</New>
-</FormTemplates>
+<p:properties xmlns:p="http://schemas.microsoft.com/office/2006/metadata/properties" xmlns:xsi="http://www.w3.org/2001/XMLSchema-instance" xmlns:pc="http://schemas.microsoft.com/office/infopath/2007/PartnerControls">
+  <documentManagement/>
+</p:properties>
 </file>
 
 <file path=customXml/itemProps1.xml><?xml version="1.0" encoding="utf-8"?>
-<ds:datastoreItem xmlns:ds="http://schemas.openxmlformats.org/officeDocument/2006/customXml" ds:itemID="{68B22CCF-3790-4DAF-9B94-BBE8105DACDB}">
+<ds:datastoreItem xmlns:ds="http://schemas.openxmlformats.org/officeDocument/2006/customXml" ds:itemID="{19285E5B-5F99-40AB-B4B4-B67FE3E29063}">
   <ds:schemaRefs>
-    <ds:schemaRef ds:uri="http://purl.org/dc/elements/1.1/"/>
-    <ds:schemaRef ds:uri="http://schemas.openxmlformats.org/package/2006/metadata/core-properties"/>
-    <ds:schemaRef ds:uri="http://schemas.microsoft.com/office/2006/documentManagement/types"/>
-    <ds:schemaRef ds:uri="7e0397fa-c04e-494e-b1f1-774ad14ae133"/>
-    <ds:schemaRef ds:uri="http://www.w3.org/XML/1998/namespace"/>
-    <ds:schemaRef ds:uri="http://schemas.microsoft.com/office/infopath/2007/PartnerControls"/>
-    <ds:schemaRef ds:uri="http://purl.org/dc/dcmitype/"/>
-    <ds:schemaRef ds:uri="8413540a-1bb6-4053-94a1-f89835fea1c0"/>
-    <ds:schemaRef ds:uri="http://schemas.microsoft.com/office/2006/metadata/properties"/>
-    <ds:schemaRef ds:uri="http://purl.org/dc/terms/"/>
+    <ds:schemaRef ds:uri="http://schemas.microsoft.com/sharepoint/v3/contenttype/forms"/>
   </ds:schemaRefs>
 </ds:datastoreItem>
 </file>
@@ -5734,9 +6414,18 @@
 </file>
 
 <file path=customXml/itemProps3.xml><?xml version="1.0" encoding="utf-8"?>
-<ds:datastoreItem xmlns:ds="http://schemas.openxmlformats.org/officeDocument/2006/customXml" ds:itemID="{19285E5B-5F99-40AB-B4B4-B67FE3E29063}">
+<ds:datastoreItem xmlns:ds="http://schemas.openxmlformats.org/officeDocument/2006/customXml" ds:itemID="{68B22CCF-3790-4DAF-9B94-BBE8105DACDB}">
   <ds:schemaRefs>
-    <ds:schemaRef ds:uri="http://schemas.microsoft.com/sharepoint/v3/contenttype/forms"/>
+    <ds:schemaRef ds:uri="http://purl.org/dc/elements/1.1/"/>
+    <ds:schemaRef ds:uri="http://schemas.openxmlformats.org/package/2006/metadata/core-properties"/>
+    <ds:schemaRef ds:uri="http://schemas.microsoft.com/office/2006/documentManagement/types"/>
+    <ds:schemaRef ds:uri="7e0397fa-c04e-494e-b1f1-774ad14ae133"/>
+    <ds:schemaRef ds:uri="http://www.w3.org/XML/1998/namespace"/>
+    <ds:schemaRef ds:uri="http://schemas.microsoft.com/office/infopath/2007/PartnerControls"/>
+    <ds:schemaRef ds:uri="http://purl.org/dc/dcmitype/"/>
+    <ds:schemaRef ds:uri="8413540a-1bb6-4053-94a1-f89835fea1c0"/>
+    <ds:schemaRef ds:uri="http://schemas.microsoft.com/office/2006/metadata/properties"/>
+    <ds:schemaRef ds:uri="http://purl.org/dc/terms/"/>
   </ds:schemaRefs>
 </ds:datastoreItem>
 </file>
</xml_diff>